<commit_message>
Updated core data info to presentation
</commit_message>
<xml_diff>
--- a/SwiftUI-Kit.pptx
+++ b/SwiftUI-Kit.pptx
@@ -5,7 +5,7 @@
     <p:sldMasterId id="2147483648" r:id="rId1"/>
   </p:sldMasterIdLst>
   <p:notesMasterIdLst>
-    <p:notesMasterId r:id="rId17"/>
+    <p:notesMasterId r:id="rId18"/>
   </p:notesMasterIdLst>
   <p:sldIdLst>
     <p:sldId id="256" r:id="rId2"/>
@@ -21,8 +21,9 @@
     <p:sldId id="266" r:id="rId12"/>
     <p:sldId id="267" r:id="rId13"/>
     <p:sldId id="269" r:id="rId14"/>
-    <p:sldId id="268" r:id="rId15"/>
-    <p:sldId id="270" r:id="rId16"/>
+    <p:sldId id="271" r:id="rId15"/>
+    <p:sldId id="268" r:id="rId16"/>
+    <p:sldId id="270" r:id="rId17"/>
   </p:sldIdLst>
   <p:sldSz cx="12192000" cy="6858000"/>
   <p:notesSz cx="6858000" cy="9144000"/>
@@ -14432,6 +14433,136 @@
           <p:cNvPr id="2" name="Title 1">
             <a:extLst>
               <a:ext uri="{FF2B5EF4-FFF2-40B4-BE49-F238E27FC236}">
+                <a16:creationId xmlns:a16="http://schemas.microsoft.com/office/drawing/2014/main" id="{BAECE944-5B35-DFD0-3642-DBD84E80F24C}"/>
+              </a:ext>
+            </a:extLst>
+          </p:cNvPr>
+          <p:cNvSpPr>
+            <a:spLocks noGrp="1"/>
+          </p:cNvSpPr>
+          <p:nvPr>
+            <p:ph type="title"/>
+          </p:nvPr>
+        </p:nvSpPr>
+        <p:spPr/>
+        <p:txBody>
+          <a:bodyPr/>
+          <a:lstStyle/>
+          <a:p>
+            <a:r>
+              <a:rPr lang="en-UA" dirty="0"/>
+              <a:t>SwiftUI and CoreData</a:t>
+            </a:r>
+          </a:p>
+        </p:txBody>
+      </p:sp>
+      <p:sp>
+        <p:nvSpPr>
+          <p:cNvPr id="3" name="Content Placeholder 2">
+            <a:extLst>
+              <a:ext uri="{FF2B5EF4-FFF2-40B4-BE49-F238E27FC236}">
+                <a16:creationId xmlns:a16="http://schemas.microsoft.com/office/drawing/2014/main" id="{BF04EFDC-09DF-53E4-CFD2-D0B4FF0FD5C5}"/>
+              </a:ext>
+            </a:extLst>
+          </p:cNvPr>
+          <p:cNvSpPr>
+            <a:spLocks noGrp="1"/>
+          </p:cNvSpPr>
+          <p:nvPr>
+            <p:ph idx="1"/>
+          </p:nvPr>
+        </p:nvSpPr>
+        <p:spPr/>
+        <p:txBody>
+          <a:bodyPr/>
+          <a:lstStyle/>
+          <a:p>
+            <a:r>
+              <a:rPr lang="en-UA" dirty="0"/>
+              <a:t>Define managed object context under App class that is the main for the app</a:t>
+            </a:r>
+          </a:p>
+          <a:p>
+            <a:r>
+              <a:rPr lang="en-UA" dirty="0"/>
+              <a:t>Use environment varibale where you need to get any data from core data</a:t>
+            </a:r>
+          </a:p>
+          <a:p>
+            <a:pPr marL="0" indent="0" algn="r">
+              <a:buNone/>
+            </a:pPr>
+            <a:r>
+              <a:rPr lang="en-GB" dirty="0"/>
+              <a:t>@Environment(\.</a:t>
+            </a:r>
+            <a:r>
+              <a:rPr lang="en-GB" dirty="0" err="1"/>
+              <a:t>managedObjectContext</a:t>
+            </a:r>
+            <a:r>
+              <a:rPr lang="en-GB" dirty="0"/>
+              <a:t>) </a:t>
+            </a:r>
+            <a:r>
+              <a:rPr lang="en-GB" i="1" dirty="0"/>
+              <a:t>private</a:t>
+            </a:r>
+            <a:r>
+              <a:rPr lang="en-GB" dirty="0"/>
+              <a:t> </a:t>
+            </a:r>
+            <a:r>
+              <a:rPr lang="en-GB" i="1" dirty="0"/>
+              <a:t>var</a:t>
+            </a:r>
+            <a:r>
+              <a:rPr lang="en-GB" dirty="0"/>
+              <a:t> </a:t>
+            </a:r>
+            <a:r>
+              <a:rPr lang="en-GB" dirty="0" err="1"/>
+              <a:t>viewContext</a:t>
+            </a:r>
+            <a:endParaRPr lang="en-UA" dirty="0"/>
+          </a:p>
+        </p:txBody>
+      </p:sp>
+    </p:spTree>
+    <p:extLst>
+      <p:ext uri="{BB962C8B-B14F-4D97-AF65-F5344CB8AC3E}">
+        <p14:creationId xmlns:p14="http://schemas.microsoft.com/office/powerpoint/2010/main" val="146758442"/>
+      </p:ext>
+    </p:extLst>
+  </p:cSld>
+  <p:clrMapOvr>
+    <a:masterClrMapping/>
+  </p:clrMapOvr>
+</p:sld>
+</file>
+
+<file path=ppt/slides/slide15.xml><?xml version="1.0" encoding="utf-8"?>
+<p:sld xmlns:a="http://schemas.openxmlformats.org/drawingml/2006/main" xmlns:r="http://schemas.openxmlformats.org/officeDocument/2006/relationships" xmlns:p="http://schemas.openxmlformats.org/presentationml/2006/main">
+  <p:cSld>
+    <p:spTree>
+      <p:nvGrpSpPr>
+        <p:cNvPr id="1" name=""/>
+        <p:cNvGrpSpPr/>
+        <p:nvPr/>
+      </p:nvGrpSpPr>
+      <p:grpSpPr>
+        <a:xfrm>
+          <a:off x="0" y="0"/>
+          <a:ext cx="0" cy="0"/>
+          <a:chOff x="0" y="0"/>
+          <a:chExt cx="0" cy="0"/>
+        </a:xfrm>
+      </p:grpSpPr>
+      <p:sp>
+        <p:nvSpPr>
+          <p:cNvPr id="2" name="Title 1">
+            <a:extLst>
+              <a:ext uri="{FF2B5EF4-FFF2-40B4-BE49-F238E27FC236}">
                 <a16:creationId xmlns:a16="http://schemas.microsoft.com/office/drawing/2014/main" id="{D646E27D-3080-1EB3-043E-9D82CE058DAF}"/>
               </a:ext>
             </a:extLst>
@@ -14619,7 +14750,7 @@
 </p:sld>
 </file>
 
-<file path=ppt/slides/slide15.xml><?xml version="1.0" encoding="utf-8"?>
+<file path=ppt/slides/slide16.xml><?xml version="1.0" encoding="utf-8"?>
 <p:sld xmlns:a="http://schemas.openxmlformats.org/drawingml/2006/main" xmlns:r="http://schemas.openxmlformats.org/officeDocument/2006/relationships" xmlns:p="http://schemas.openxmlformats.org/presentationml/2006/main">
   <p:cSld>
     <p:spTree>

</xml_diff>